<commit_message>
Final version - v3
</commit_message>
<xml_diff>
--- a/presentation/Soutenance.pptx
+++ b/presentation/Soutenance.pptx
@@ -219,7 +219,7 @@
           <a:p>
             <a:fld id="{7A56724F-4DC6-4752-89CA-94A66C3EBEFF}" type="datetimeFigureOut">
               <a:rPr lang="en-GB" smtClean="0"/>
-              <a:t>20/06/2018</a:t>
+              <a:t>25/06/2018</a:t>
             </a:fld>
             <a:endParaRPr lang="en-GB" dirty="0"/>
           </a:p>
@@ -605,7 +605,7 @@
             <a:fld id="{4037810F-9E72-4A49-B2D7-DE35064A2713}" type="datetimeFigureOut">
               <a:rPr lang="en-GB" smtClean="0"/>
               <a:pPr/>
-              <a:t>20/06/2018</a:t>
+              <a:t>25/06/2018</a:t>
             </a:fld>
             <a:endParaRPr lang="en-GB" dirty="0"/>
           </a:p>
@@ -830,7 +830,7 @@
           <a:p>
             <a:fld id="{EE2E961C-17CE-4E1C-8FEE-FBC93CDB68C8}" type="datetimeFigureOut">
               <a:rPr lang="en-GB" smtClean="0"/>
-              <a:t>20/06/2018</a:t>
+              <a:t>25/06/2018</a:t>
             </a:fld>
             <a:endParaRPr lang="en-GB" dirty="0"/>
           </a:p>
@@ -1168,7 +1168,7 @@
           <a:p>
             <a:fld id="{EE2E961C-17CE-4E1C-8FEE-FBC93CDB68C8}" type="datetimeFigureOut">
               <a:rPr lang="en-GB" smtClean="0"/>
-              <a:t>20/06/2018</a:t>
+              <a:t>25/06/2018</a:t>
             </a:fld>
             <a:endParaRPr lang="en-GB" dirty="0"/>
           </a:p>
@@ -1294,7 +1294,7 @@
           <a:p>
             <a:fld id="{EE2E961C-17CE-4E1C-8FEE-FBC93CDB68C8}" type="datetimeFigureOut">
               <a:rPr lang="en-GB" smtClean="0"/>
-              <a:t>20/06/2018</a:t>
+              <a:t>25/06/2018</a:t>
             </a:fld>
             <a:endParaRPr lang="en-GB" dirty="0"/>
           </a:p>
@@ -1611,7 +1611,7 @@
           <a:p>
             <a:fld id="{EE2E961C-17CE-4E1C-8FEE-FBC93CDB68C8}" type="datetimeFigureOut">
               <a:rPr lang="en-GB" smtClean="0"/>
-              <a:t>20/06/2018</a:t>
+              <a:t>25/06/2018</a:t>
             </a:fld>
             <a:endParaRPr lang="en-GB" dirty="0"/>
           </a:p>
@@ -1904,7 +1904,7 @@
           <a:p>
             <a:fld id="{EE2E961C-17CE-4E1C-8FEE-FBC93CDB68C8}" type="datetimeFigureOut">
               <a:rPr lang="en-GB" smtClean="0"/>
-              <a:t>20/06/2018</a:t>
+              <a:t>25/06/2018</a:t>
             </a:fld>
             <a:endParaRPr lang="en-GB" dirty="0"/>
           </a:p>
@@ -2121,7 +2121,7 @@
           <a:p>
             <a:fld id="{EE2E961C-17CE-4E1C-8FEE-FBC93CDB68C8}" type="datetimeFigureOut">
               <a:rPr lang="en-GB" smtClean="0"/>
-              <a:t>20/06/2018</a:t>
+              <a:t>25/06/2018</a:t>
             </a:fld>
             <a:endParaRPr lang="en-GB" dirty="0"/>
           </a:p>
@@ -2338,7 +2338,7 @@
           <a:p>
             <a:fld id="{EE2E961C-17CE-4E1C-8FEE-FBC93CDB68C8}" type="datetimeFigureOut">
               <a:rPr lang="en-GB" smtClean="0"/>
-              <a:t>20/06/2018</a:t>
+              <a:t>25/06/2018</a:t>
             </a:fld>
             <a:endParaRPr lang="en-GB" dirty="0"/>
           </a:p>
@@ -2510,7 +2510,7 @@
             <a:fld id="{4037810F-9E72-4A49-B2D7-DE35064A2713}" type="datetimeFigureOut">
               <a:rPr lang="en-GB" smtClean="0"/>
               <a:pPr/>
-              <a:t>20/06/2018</a:t>
+              <a:t>25/06/2018</a:t>
             </a:fld>
             <a:endParaRPr lang="en-GB" dirty="0"/>
           </a:p>
@@ -2619,6 +2619,39 @@
           <a:prstGeom prst="rect">
             <a:avLst/>
           </a:prstGeom>
+        </p:spPr>
+      </p:pic>
+      <p:pic>
+        <p:nvPicPr>
+          <p:cNvPr id="2" name="Grafik 1"/>
+          <p:cNvPicPr>
+            <a:picLocks noChangeAspect="1"/>
+          </p:cNvPicPr>
+          <p:nvPr userDrawn="1"/>
+        </p:nvPicPr>
+        <p:blipFill>
+          <a:blip r:embed="rId13" cstate="print">
+            <a:extLst>
+              <a:ext uri="{28A0092B-C50C-407E-A947-70E740481C1C}">
+                <a14:useLocalDpi xmlns:a14="http://schemas.microsoft.com/office/drawing/2010/main" val="0"/>
+              </a:ext>
+            </a:extLst>
+          </a:blip>
+          <a:stretch>
+            <a:fillRect/>
+          </a:stretch>
+        </p:blipFill>
+        <p:spPr>
+          <a:xfrm>
+            <a:off x="7511899" y="44624"/>
+            <a:ext cx="886758" cy="523459"/>
+          </a:xfrm>
+          <a:prstGeom prst="rect">
+            <a:avLst/>
+          </a:prstGeom>
+          <a:solidFill>
+            <a:schemeClr val="bg1"/>
+          </a:solidFill>
         </p:spPr>
       </p:pic>
     </p:spTree>
@@ -2939,8 +2972,8 @@
         </p:blipFill>
         <p:spPr>
           <a:xfrm>
-            <a:off x="0" y="0"/>
-            <a:ext cx="9137139" cy="6858000"/>
+            <a:off x="-36512" y="-27406"/>
+            <a:ext cx="9173652" cy="6885405"/>
           </a:xfrm>
           <a:prstGeom prst="rect">
             <a:avLst/>
@@ -2955,7 +2988,7 @@
         </p:nvSpPr>
         <p:spPr>
           <a:xfrm>
-            <a:off x="724606" y="1772816"/>
+            <a:off x="724606" y="2132856"/>
             <a:ext cx="6120680" cy="1077218"/>
           </a:xfrm>
           <a:prstGeom prst="rect">
@@ -3001,7 +3034,7 @@
         </p:nvSpPr>
         <p:spPr>
           <a:xfrm>
-            <a:off x="724606" y="3645024"/>
+            <a:off x="724606" y="3789040"/>
             <a:ext cx="7735826" cy="1200329"/>
           </a:xfrm>
           <a:prstGeom prst="rect">
@@ -3388,6 +3421,37 @@
               </a:rPr>
               <a:t>Scan evidences how the plate vibrates in anti-phase with the speaker.</a:t>
             </a:r>
+          </a:p>
+        </p:txBody>
+      </p:sp>
+      <p:sp>
+        <p:nvSpPr>
+          <p:cNvPr id="9" name="Textfeld 8"/>
+          <p:cNvSpPr txBox="1"/>
+          <p:nvPr/>
+        </p:nvSpPr>
+        <p:spPr>
+          <a:xfrm>
+            <a:off x="1502842" y="6280819"/>
+            <a:ext cx="3869556" cy="230832"/>
+          </a:xfrm>
+          <a:prstGeom prst="rect">
+            <a:avLst/>
+          </a:prstGeom>
+          <a:noFill/>
+        </p:spPr>
+        <p:txBody>
+          <a:bodyPr wrap="square" rtlCol="0">
+            <a:spAutoFit/>
+          </a:bodyPr>
+          <a:lstStyle/>
+          <a:p>
+            <a:pPr algn="ctr"/>
+            <a:r>
+              <a:rPr lang="en-GB" sz="900" i="1" dirty="0" smtClean="0"/>
+              <a:t>Comparison of radiated sound power for different measurement conditions</a:t>
+            </a:r>
+            <a:endParaRPr lang="en-GB" sz="900" i="1" dirty="0"/>
           </a:p>
         </p:txBody>
       </p:sp>
@@ -3451,6 +3515,32 @@
                             </p:childTnLst>
                           </p:cTn>
                         </p:par>
+                        <p:par>
+                          <p:cTn id="7" fill="hold">
+                            <p:stCondLst>
+                              <p:cond delay="0"/>
+                            </p:stCondLst>
+                            <p:childTnLst>
+                              <p:par>
+                                <p:cTn id="8" presetID="1" presetClass="mediacall" presetSubtype="0" fill="hold" nodeType="afterEffect">
+                                  <p:stCondLst>
+                                    <p:cond delay="0"/>
+                                  </p:stCondLst>
+                                  <p:childTnLst>
+                                    <p:cmd type="call" cmd="playFrom(0.0)">
+                                      <p:cBhvr>
+                                        <p:cTn id="9" dur="2640" fill="hold"/>
+                                        <p:tgtEl>
+                                          <p:spTgt spid="11"/>
+                                        </p:tgtEl>
+                                      </p:cBhvr>
+                                    </p:cmd>
+                                  </p:childTnLst>
+                                </p:cTn>
+                              </p:par>
+                            </p:childTnLst>
+                          </p:cTn>
+                        </p:par>
                       </p:childTnLst>
                     </p:cTn>
                   </p:par>
@@ -3471,8 +3561,20 @@
                 </p:cond>
               </p:nextCondLst>
             </p:seq>
+            <p:video>
+              <p:cMediaNode vol="80000">
+                <p:cTn id="10" repeatCount="indefinite" fill="hold" display="0">
+                  <p:stCondLst>
+                    <p:cond delay="indefinite"/>
+                  </p:stCondLst>
+                </p:cTn>
+                <p:tgtEl>
+                  <p:spTgt spid="11"/>
+                </p:tgtEl>
+              </p:cMediaNode>
+            </p:video>
             <p:seq concurrent="1" nextAc="seek">
-              <p:cTn id="7" restart="whenNotActive" fill="hold" evtFilter="cancelBubble" nodeType="interactiveSeq">
+              <p:cTn id="11" restart="whenNotActive" fill="hold" evtFilter="cancelBubble" nodeType="interactiveSeq">
                 <p:stCondLst>
                   <p:cond evt="onClick" delay="0">
                     <p:tgtEl>
@@ -3485,26 +3587,26 @@
                 </p:endSync>
                 <p:childTnLst>
                   <p:par>
-                    <p:cTn id="8" fill="hold">
+                    <p:cTn id="12" fill="hold">
                       <p:stCondLst>
                         <p:cond delay="0"/>
                       </p:stCondLst>
                       <p:childTnLst>
                         <p:par>
-                          <p:cTn id="9" fill="hold">
+                          <p:cTn id="13" fill="hold">
                             <p:stCondLst>
                               <p:cond delay="0"/>
                             </p:stCondLst>
                             <p:childTnLst>
                               <p:par>
-                                <p:cTn id="10" presetID="2" presetClass="mediacall" presetSubtype="0" fill="hold" nodeType="clickEffect">
+                                <p:cTn id="14" presetID="2" presetClass="mediacall" presetSubtype="0" fill="hold" nodeType="clickEffect">
                                   <p:stCondLst>
                                     <p:cond delay="0"/>
                                   </p:stCondLst>
                                   <p:childTnLst>
                                     <p:cmd type="call" cmd="togglePause">
                                       <p:cBhvr>
-                                        <p:cTn id="11" dur="1" fill="hold"/>
+                                        <p:cTn id="15" dur="1" fill="hold"/>
                                         <p:tgtEl>
                                           <p:spTgt spid="11"/>
                                         </p:tgtEl>
@@ -3529,18 +3631,6 @@
                 </p:cond>
               </p:nextCondLst>
             </p:seq>
-            <p:video>
-              <p:cMediaNode vol="80000">
-                <p:cTn id="12" repeatCount="indefinite" fill="hold" display="0">
-                  <p:stCondLst>
-                    <p:cond delay="indefinite"/>
-                  </p:stCondLst>
-                </p:cTn>
-                <p:tgtEl>
-                  <p:spTgt spid="11"/>
-                </p:tgtEl>
-              </p:cMediaNode>
-            </p:video>
           </p:childTnLst>
         </p:cTn>
       </p:par>
@@ -3808,7 +3898,27 @@
                   </a:schemeClr>
                 </a:solidFill>
               </a:rPr>
-              <a:t>If the field separation cannot be applied, using an elliptical measurement grid allows to ease off the baffle effect.</a:t>
+              <a:t>If the field separation cannot be applied, using </a:t>
+            </a:r>
+            <a:r>
+              <a:rPr lang="en-GB" dirty="0" smtClean="0">
+                <a:solidFill>
+                  <a:schemeClr val="tx2">
+                    <a:lumMod val="50000"/>
+                  </a:schemeClr>
+                </a:solidFill>
+              </a:rPr>
+              <a:t>an elliptical </a:t>
+            </a:r>
+            <a:r>
+              <a:rPr lang="en-GB" dirty="0" smtClean="0">
+                <a:solidFill>
+                  <a:schemeClr val="tx2">
+                    <a:lumMod val="50000"/>
+                  </a:schemeClr>
+                </a:solidFill>
+              </a:rPr>
+              <a:t>measurement grid allows to ease off the baffle effect.</a:t>
             </a:r>
             <a:endParaRPr lang="en-GB" dirty="0">
               <a:solidFill>
@@ -3995,6 +4105,37 @@
           </a:p>
         </p:txBody>
       </p:sp>
+      <p:sp>
+        <p:nvSpPr>
+          <p:cNvPr id="5" name="Textfeld 4"/>
+          <p:cNvSpPr txBox="1"/>
+          <p:nvPr/>
+        </p:nvSpPr>
+        <p:spPr>
+          <a:xfrm>
+            <a:off x="1370919" y="6065566"/>
+            <a:ext cx="3869556" cy="230832"/>
+          </a:xfrm>
+          <a:prstGeom prst="rect">
+            <a:avLst/>
+          </a:prstGeom>
+          <a:noFill/>
+        </p:spPr>
+        <p:txBody>
+          <a:bodyPr wrap="square" rtlCol="0">
+            <a:spAutoFit/>
+          </a:bodyPr>
+          <a:lstStyle/>
+          <a:p>
+            <a:pPr algn="ctr"/>
+            <a:r>
+              <a:rPr lang="en-GB" sz="900" i="1" dirty="0" smtClean="0"/>
+              <a:t>Comparison of spherical and elliptical grids</a:t>
+            </a:r>
+            <a:endParaRPr lang="en-GB" sz="900" i="1" dirty="0"/>
+          </a:p>
+        </p:txBody>
+      </p:sp>
     </p:spTree>
     <p:extLst>
       <p:ext uri="{BB962C8B-B14F-4D97-AF65-F5344CB8AC3E}">
@@ -4134,16 +4275,59 @@
           </a:p>
         </p:txBody>
       </p:sp>
+      <p:sp>
+        <p:nvSpPr>
+          <p:cNvPr id="5" name="Textfeld 4"/>
+          <p:cNvSpPr txBox="1"/>
+          <p:nvPr/>
+        </p:nvSpPr>
+        <p:spPr>
+          <a:xfrm>
+            <a:off x="107504" y="836712"/>
+            <a:ext cx="8928992" cy="646331"/>
+          </a:xfrm>
+          <a:prstGeom prst="rect">
+            <a:avLst/>
+          </a:prstGeom>
+          <a:noFill/>
+        </p:spPr>
+        <p:txBody>
+          <a:bodyPr wrap="square" rtlCol="0">
+            <a:spAutoFit/>
+          </a:bodyPr>
+          <a:lstStyle/>
+          <a:p>
+            <a:pPr algn="just"/>
+            <a:r>
+              <a:rPr lang="en-GB" dirty="0" smtClean="0">
+                <a:solidFill>
+                  <a:schemeClr val="tx2">
+                    <a:lumMod val="50000"/>
+                  </a:schemeClr>
+                </a:solidFill>
+              </a:rPr>
+              <a:t>Symmetries on the Device Under Test geometry yield symmetries on its emitted sound field, thus on the coefficients weighting the spherical harmonics in the spherical wave expansion. </a:t>
+            </a:r>
+            <a:endParaRPr lang="en-GB" dirty="0">
+              <a:solidFill>
+                <a:schemeClr val="tx2">
+                  <a:lumMod val="50000"/>
+                </a:schemeClr>
+              </a:solidFill>
+            </a:endParaRPr>
+          </a:p>
+        </p:txBody>
+      </p:sp>
       <p:pic>
         <p:nvPicPr>
-          <p:cNvPr id="3" name="Grafik 2"/>
+          <p:cNvPr id="6" name="Grafik 5"/>
           <p:cNvPicPr>
             <a:picLocks noChangeAspect="1"/>
           </p:cNvPicPr>
           <p:nvPr/>
         </p:nvPicPr>
         <p:blipFill>
-          <a:blip r:embed="rId2">
+          <a:blip r:embed="rId2" cstate="print">
             <a:extLst>
               <a:ext uri="{28A0092B-C50C-407E-A947-70E740481C1C}">
                 <a14:useLocalDpi xmlns:a14="http://schemas.microsoft.com/office/drawing/2010/main" val="0"/>
@@ -4156,8 +4340,8 @@
         </p:blipFill>
         <p:spPr>
           <a:xfrm>
-            <a:off x="661137" y="908719"/>
-            <a:ext cx="7668344" cy="1220899"/>
+            <a:off x="1853952" y="1700808"/>
+            <a:ext cx="5436096" cy="816802"/>
           </a:xfrm>
           <a:prstGeom prst="rect">
             <a:avLst/>
@@ -4166,7 +4350,7 @@
       </p:pic>
       <p:pic>
         <p:nvPicPr>
-          <p:cNvPr id="4" name="Grafik 3"/>
+          <p:cNvPr id="7" name="Grafik 6"/>
           <p:cNvPicPr>
             <a:picLocks noChangeAspect="1"/>
           </p:cNvPicPr>
@@ -4186,14 +4370,45 @@
         </p:blipFill>
         <p:spPr>
           <a:xfrm>
-            <a:off x="236537" y="2889034"/>
-            <a:ext cx="6009252" cy="3287798"/>
+            <a:off x="1475656" y="2924944"/>
+            <a:ext cx="6012160" cy="3289389"/>
           </a:xfrm>
           <a:prstGeom prst="rect">
             <a:avLst/>
           </a:prstGeom>
         </p:spPr>
       </p:pic>
+      <p:sp>
+        <p:nvSpPr>
+          <p:cNvPr id="8" name="Textfeld 7"/>
+          <p:cNvSpPr txBox="1"/>
+          <p:nvPr/>
+        </p:nvSpPr>
+        <p:spPr>
+          <a:xfrm>
+            <a:off x="2637222" y="6272981"/>
+            <a:ext cx="3869556" cy="230832"/>
+          </a:xfrm>
+          <a:prstGeom prst="rect">
+            <a:avLst/>
+          </a:prstGeom>
+          <a:noFill/>
+        </p:spPr>
+        <p:txBody>
+          <a:bodyPr wrap="square" rtlCol="0">
+            <a:spAutoFit/>
+          </a:bodyPr>
+          <a:lstStyle/>
+          <a:p>
+            <a:pPr algn="ctr"/>
+            <a:r>
+              <a:rPr lang="en-GB" sz="900" i="1" dirty="0" smtClean="0"/>
+              <a:t>Representation of the first spherical harmonics</a:t>
+            </a:r>
+            <a:endParaRPr lang="en-GB" sz="900" i="1" dirty="0"/>
+          </a:p>
+        </p:txBody>
+      </p:sp>
     </p:spTree>
     <p:extLst>
       <p:ext uri="{BB962C8B-B14F-4D97-AF65-F5344CB8AC3E}">
@@ -4252,6 +4467,79 @@
               <a:t>Principle</a:t>
             </a:r>
             <a:endParaRPr lang="en-GB" dirty="0"/>
+          </a:p>
+        </p:txBody>
+      </p:sp>
+      <p:pic>
+        <p:nvPicPr>
+          <p:cNvPr id="3" name="Grafik 2"/>
+          <p:cNvPicPr>
+            <a:picLocks noChangeAspect="1"/>
+          </p:cNvPicPr>
+          <p:nvPr/>
+        </p:nvPicPr>
+        <p:blipFill>
+          <a:blip r:embed="rId2">
+            <a:extLst>
+              <a:ext uri="{28A0092B-C50C-407E-A947-70E740481C1C}">
+                <a14:useLocalDpi xmlns:a14="http://schemas.microsoft.com/office/drawing/2010/main" val="0"/>
+              </a:ext>
+            </a:extLst>
+          </a:blip>
+          <a:stretch>
+            <a:fillRect/>
+          </a:stretch>
+        </p:blipFill>
+        <p:spPr>
+          <a:xfrm>
+            <a:off x="0" y="1844824"/>
+            <a:ext cx="9144000" cy="2725254"/>
+          </a:xfrm>
+          <a:prstGeom prst="rect">
+            <a:avLst/>
+          </a:prstGeom>
+        </p:spPr>
+      </p:pic>
+      <p:sp>
+        <p:nvSpPr>
+          <p:cNvPr id="4" name="Textfeld 3"/>
+          <p:cNvSpPr txBox="1"/>
+          <p:nvPr/>
+        </p:nvSpPr>
+        <p:spPr>
+          <a:xfrm>
+            <a:off x="0" y="908720"/>
+            <a:ext cx="9144000" cy="369332"/>
+          </a:xfrm>
+          <a:prstGeom prst="rect">
+            <a:avLst/>
+          </a:prstGeom>
+          <a:noFill/>
+        </p:spPr>
+        <p:txBody>
+          <a:bodyPr wrap="square" rtlCol="0">
+            <a:spAutoFit/>
+          </a:bodyPr>
+          <a:lstStyle/>
+          <a:p>
+            <a:pPr algn="ctr"/>
+            <a:r>
+              <a:rPr lang="en-GB" dirty="0" smtClean="0">
+                <a:solidFill>
+                  <a:schemeClr val="tx2">
+                    <a:lumMod val="50000"/>
+                  </a:schemeClr>
+                </a:solidFill>
+              </a:rPr>
+              <a:t>Symmetries under study</a:t>
+            </a:r>
+            <a:endParaRPr lang="en-GB" dirty="0">
+              <a:solidFill>
+                <a:schemeClr val="tx2">
+                  <a:lumMod val="50000"/>
+                </a:schemeClr>
+              </a:solidFill>
+            </a:endParaRPr>
           </a:p>
         </p:txBody>
       </p:sp>
@@ -4948,6 +5236,69 @@
           </a:prstGeom>
         </p:spPr>
       </p:pic>
+      <p:sp>
+        <p:nvSpPr>
+          <p:cNvPr id="5" name="Textfeld 4"/>
+          <p:cNvSpPr txBox="1"/>
+          <p:nvPr/>
+        </p:nvSpPr>
+        <p:spPr>
+          <a:xfrm>
+            <a:off x="5908454" y="764704"/>
+            <a:ext cx="2768002" cy="1477328"/>
+          </a:xfrm>
+          <a:prstGeom prst="rect">
+            <a:avLst/>
+          </a:prstGeom>
+          <a:noFill/>
+        </p:spPr>
+        <p:txBody>
+          <a:bodyPr wrap="square" rtlCol="0">
+            <a:spAutoFit/>
+          </a:bodyPr>
+          <a:lstStyle/>
+          <a:p>
+            <a:r>
+              <a:rPr lang="en-GB" dirty="0" smtClean="0">
+                <a:solidFill>
+                  <a:schemeClr val="tx2">
+                    <a:lumMod val="50000"/>
+                  </a:schemeClr>
+                </a:solidFill>
+              </a:rPr>
+              <a:t>Dip in symmetry factors at the crossover range.</a:t>
+            </a:r>
+          </a:p>
+          <a:p>
+            <a:endParaRPr lang="en-GB" dirty="0">
+              <a:solidFill>
+                <a:schemeClr val="tx2">
+                  <a:lumMod val="50000"/>
+                </a:schemeClr>
+              </a:solidFill>
+            </a:endParaRPr>
+          </a:p>
+          <a:p>
+            <a:r>
+              <a:rPr lang="en-GB" dirty="0" smtClean="0">
+                <a:solidFill>
+                  <a:schemeClr val="tx2">
+                    <a:lumMod val="50000"/>
+                  </a:schemeClr>
+                </a:solidFill>
+              </a:rPr>
+              <a:t>Single plane symmetries are dominant.</a:t>
+            </a:r>
+            <a:endParaRPr lang="en-GB" dirty="0">
+              <a:solidFill>
+                <a:schemeClr val="tx2">
+                  <a:lumMod val="50000"/>
+                </a:schemeClr>
+              </a:solidFill>
+            </a:endParaRPr>
+          </a:p>
+        </p:txBody>
+      </p:sp>
     </p:spTree>
     <p:extLst>
       <p:ext uri="{BB962C8B-B14F-4D97-AF65-F5344CB8AC3E}">
@@ -6007,25 +6358,8 @@
                   </a:schemeClr>
                 </a:solidFill>
               </a:rPr>
-              <a:t>Measurements in the Near Field of </a:t>
-            </a:r>
-            <a:r>
-              <a:rPr lang="en-GB" dirty="0" smtClean="0">
-                <a:solidFill>
-                  <a:schemeClr val="tx2">
-                    <a:lumMod val="50000"/>
-                  </a:schemeClr>
-                </a:solidFill>
-              </a:rPr>
-              <a:t>devices.</a:t>
-            </a:r>
-            <a:endParaRPr lang="en-GB" dirty="0" smtClean="0">
-              <a:solidFill>
-                <a:schemeClr val="tx2">
-                  <a:lumMod val="50000"/>
-                </a:schemeClr>
-              </a:solidFill>
-            </a:endParaRPr>
+              <a:t>Measurements in the Near Field of devices.</a:t>
+            </a:r>
           </a:p>
           <a:p>
             <a:pPr marL="285750" indent="-285750">
@@ -6063,17 +6397,7 @@
                   </a:schemeClr>
                 </a:solidFill>
               </a:rPr>
-              <a:t>Field </a:t>
-            </a:r>
-            <a:r>
-              <a:rPr lang="en-GB" u="sng" dirty="0" smtClean="0">
-                <a:solidFill>
-                  <a:schemeClr val="tx2">
-                    <a:lumMod val="50000"/>
-                  </a:schemeClr>
-                </a:solidFill>
-              </a:rPr>
-              <a:t>Separation</a:t>
+              <a:t>Field Separation</a:t>
             </a:r>
             <a:r>
               <a:rPr lang="en-GB" dirty="0" smtClean="0">
@@ -6085,13 +6409,6 @@
               </a:rPr>
               <a:t> to remove the boundaries effects on the measurement.</a:t>
             </a:r>
-            <a:endParaRPr lang="en-GB" dirty="0" smtClean="0">
-              <a:solidFill>
-                <a:schemeClr val="tx2">
-                  <a:lumMod val="50000"/>
-                </a:schemeClr>
-              </a:solidFill>
-            </a:endParaRPr>
           </a:p>
           <a:p>
             <a:pPr marL="285750" indent="-285750">
@@ -6119,45 +6436,8 @@
                   </a:schemeClr>
                 </a:solidFill>
               </a:rPr>
-              <a:t>Visualization of results at any point on the 3D </a:t>
-            </a:r>
-            <a:r>
-              <a:rPr lang="en-GB" dirty="0" smtClean="0">
-                <a:solidFill>
-                  <a:schemeClr val="tx2">
-                    <a:lumMod val="50000"/>
-                  </a:schemeClr>
-                </a:solidFill>
-              </a:rPr>
-              <a:t>space </a:t>
-            </a:r>
-            <a:r>
-              <a:rPr lang="en-GB" dirty="0" smtClean="0">
-                <a:solidFill>
-                  <a:schemeClr val="tx2">
-                    <a:lumMod val="50000"/>
-                  </a:schemeClr>
-                </a:solidFill>
-              </a:rPr>
-              <a:t>in the Far Field of the </a:t>
-            </a:r>
-            <a:r>
-              <a:rPr lang="en-GB" dirty="0" smtClean="0">
-                <a:solidFill>
-                  <a:schemeClr val="tx2">
-                    <a:lumMod val="50000"/>
-                  </a:schemeClr>
-                </a:solidFill>
-              </a:rPr>
-              <a:t>device.</a:t>
-            </a:r>
-            <a:endParaRPr lang="en-GB" dirty="0" smtClean="0">
-              <a:solidFill>
-                <a:schemeClr val="tx2">
-                  <a:lumMod val="50000"/>
-                </a:schemeClr>
-              </a:solidFill>
-            </a:endParaRPr>
+              <a:t>Visualization of results at any point on the 3D space in the Far Field of the device.</a:t>
+            </a:r>
           </a:p>
           <a:p>
             <a:pPr marL="285750" indent="-285750">
@@ -6185,25 +6465,8 @@
                   </a:schemeClr>
                 </a:solidFill>
               </a:rPr>
-              <a:t>Microphone moves thanks to a robotic </a:t>
-            </a:r>
-            <a:r>
-              <a:rPr lang="en-GB" dirty="0" smtClean="0">
-                <a:solidFill>
-                  <a:schemeClr val="tx2">
-                    <a:lumMod val="50000"/>
-                  </a:schemeClr>
-                </a:solidFill>
-              </a:rPr>
-              <a:t>arm.</a:t>
-            </a:r>
-            <a:endParaRPr lang="en-GB" dirty="0" smtClean="0">
-              <a:solidFill>
-                <a:schemeClr val="tx2">
-                  <a:lumMod val="50000"/>
-                </a:schemeClr>
-              </a:solidFill>
-            </a:endParaRPr>
+              <a:t>Microphone moves thanks to a robotic arm.</a:t>
+            </a:r>
           </a:p>
           <a:p>
             <a:pPr marL="285750" indent="-285750">
@@ -6231,17 +6494,7 @@
                   </a:schemeClr>
                 </a:solidFill>
               </a:rPr>
-              <a:t>Constant interaction between the acoustic boundaries and the </a:t>
-            </a:r>
-            <a:r>
-              <a:rPr lang="en-GB" dirty="0" smtClean="0">
-                <a:solidFill>
-                  <a:schemeClr val="tx2">
-                    <a:lumMod val="50000"/>
-                  </a:schemeClr>
-                </a:solidFill>
-              </a:rPr>
-              <a:t>system.</a:t>
+              <a:t>Constant interaction between the acoustic boundaries and the system.</a:t>
             </a:r>
             <a:endParaRPr lang="en-GB" dirty="0">
               <a:solidFill>
@@ -6250,6 +6503,37 @@
                 </a:schemeClr>
               </a:solidFill>
             </a:endParaRPr>
+          </a:p>
+        </p:txBody>
+      </p:sp>
+      <p:sp>
+        <p:nvSpPr>
+          <p:cNvPr id="4" name="Textfeld 3"/>
+          <p:cNvSpPr txBox="1"/>
+          <p:nvPr/>
+        </p:nvSpPr>
+        <p:spPr>
+          <a:xfrm>
+            <a:off x="202382" y="6280819"/>
+            <a:ext cx="3869556" cy="230832"/>
+          </a:xfrm>
+          <a:prstGeom prst="rect">
+            <a:avLst/>
+          </a:prstGeom>
+          <a:noFill/>
+        </p:spPr>
+        <p:txBody>
+          <a:bodyPr wrap="square" rtlCol="0">
+            <a:spAutoFit/>
+          </a:bodyPr>
+          <a:lstStyle/>
+          <a:p>
+            <a:pPr algn="ctr"/>
+            <a:r>
+              <a:rPr lang="en-GB" sz="900" i="1" dirty="0" smtClean="0"/>
+              <a:t>Klippel Near Field Scanner</a:t>
+            </a:r>
+            <a:endParaRPr lang="en-GB" sz="900" i="1" dirty="0"/>
           </a:p>
         </p:txBody>
       </p:sp>
@@ -6857,7 +7141,17 @@
                   </a:schemeClr>
                 </a:solidFill>
               </a:rPr>
-              <a:t>General expression of sound field in spherical coordinates:</a:t>
+              <a:t>General expression of sound field in spherical </a:t>
+            </a:r>
+            <a:r>
+              <a:rPr lang="en-GB" dirty="0" smtClean="0">
+                <a:solidFill>
+                  <a:schemeClr val="accent1">
+                    <a:lumMod val="50000"/>
+                  </a:schemeClr>
+                </a:solidFill>
+              </a:rPr>
+              <a:t>coordinates (wave expansion):</a:t>
             </a:r>
             <a:endParaRPr lang="en-GB" dirty="0">
               <a:solidFill>
@@ -8156,6 +8450,37 @@
           </a:p>
         </p:txBody>
       </p:sp>
+      <p:sp>
+        <p:nvSpPr>
+          <p:cNvPr id="16" name="Textfeld 15"/>
+          <p:cNvSpPr txBox="1"/>
+          <p:nvPr/>
+        </p:nvSpPr>
+        <p:spPr>
+          <a:xfrm>
+            <a:off x="188313" y="6272981"/>
+            <a:ext cx="1944216" cy="230832"/>
+          </a:xfrm>
+          <a:prstGeom prst="rect">
+            <a:avLst/>
+          </a:prstGeom>
+          <a:noFill/>
+        </p:spPr>
+        <p:txBody>
+          <a:bodyPr wrap="square" rtlCol="0">
+            <a:spAutoFit/>
+          </a:bodyPr>
+          <a:lstStyle/>
+          <a:p>
+            <a:pPr algn="ctr"/>
+            <a:r>
+              <a:rPr lang="en-GB" sz="900" i="1" dirty="0" smtClean="0"/>
+              <a:t>Field Separation principle</a:t>
+            </a:r>
+            <a:endParaRPr lang="en-GB" sz="900" i="1" dirty="0"/>
+          </a:p>
+        </p:txBody>
+      </p:sp>
     </p:spTree>
     <p:extLst>
       <p:ext uri="{BB962C8B-B14F-4D97-AF65-F5344CB8AC3E}">
@@ -8817,8 +9142,28 @@
                   </a:schemeClr>
                 </a:solidFill>
               </a:rPr>
-              <a:t>Aim: critical </a:t>
-            </a:r>
+              <a:t>Aim: critical evaluation of the prototype.</a:t>
+            </a:r>
+          </a:p>
+          <a:p>
+            <a:endParaRPr lang="en-GB" dirty="0" smtClean="0">
+              <a:solidFill>
+                <a:schemeClr val="tx2">
+                  <a:lumMod val="50000"/>
+                </a:schemeClr>
+              </a:solidFill>
+            </a:endParaRPr>
+          </a:p>
+          <a:p>
+            <a:endParaRPr lang="en-GB" dirty="0">
+              <a:solidFill>
+                <a:schemeClr val="tx2">
+                  <a:lumMod val="50000"/>
+                </a:schemeClr>
+              </a:solidFill>
+            </a:endParaRPr>
+          </a:p>
+          <a:p>
             <a:r>
               <a:rPr lang="en-GB" dirty="0" smtClean="0">
                 <a:solidFill>
@@ -8827,72 +9172,8 @@
                   </a:schemeClr>
                 </a:solidFill>
               </a:rPr>
-              <a:t>evaluation of the </a:t>
-            </a:r>
-            <a:r>
-              <a:rPr lang="en-GB" dirty="0" smtClean="0">
-                <a:solidFill>
-                  <a:schemeClr val="tx2">
-                    <a:lumMod val="50000"/>
-                  </a:schemeClr>
-                </a:solidFill>
-              </a:rPr>
-              <a:t>prototype.</a:t>
-            </a:r>
-            <a:endParaRPr lang="en-GB" dirty="0" smtClean="0">
-              <a:solidFill>
-                <a:schemeClr val="tx2">
-                  <a:lumMod val="50000"/>
-                </a:schemeClr>
-              </a:solidFill>
-            </a:endParaRPr>
-          </a:p>
-          <a:p>
-            <a:endParaRPr lang="en-GB" dirty="0" smtClean="0">
-              <a:solidFill>
-                <a:schemeClr val="tx2">
-                  <a:lumMod val="50000"/>
-                </a:schemeClr>
-              </a:solidFill>
-            </a:endParaRPr>
-          </a:p>
-          <a:p>
-            <a:endParaRPr lang="en-GB" dirty="0">
-              <a:solidFill>
-                <a:schemeClr val="tx2">
-                  <a:lumMod val="50000"/>
-                </a:schemeClr>
-              </a:solidFill>
-            </a:endParaRPr>
-          </a:p>
-          <a:p>
-            <a:r>
-              <a:rPr lang="en-GB" dirty="0" smtClean="0">
-                <a:solidFill>
-                  <a:schemeClr val="tx2">
-                    <a:lumMod val="50000"/>
-                  </a:schemeClr>
-                </a:solidFill>
-              </a:rPr>
-              <a:t>Influence of the baffle isn’t important, since it will be removed by field </a:t>
-            </a:r>
-            <a:r>
-              <a:rPr lang="en-GB" dirty="0" smtClean="0">
-                <a:solidFill>
-                  <a:schemeClr val="tx2">
-                    <a:lumMod val="50000"/>
-                  </a:schemeClr>
-                </a:solidFill>
-              </a:rPr>
-              <a:t>separation.</a:t>
-            </a:r>
-            <a:endParaRPr lang="en-GB" dirty="0" smtClean="0">
-              <a:solidFill>
-                <a:schemeClr val="tx2">
-                  <a:lumMod val="50000"/>
-                </a:schemeClr>
-              </a:solidFill>
-            </a:endParaRPr>
+              <a:t>Influence of the baffle isn’t important, since it will be removed by field separation.</a:t>
+            </a:r>
           </a:p>
           <a:p>
             <a:endParaRPr lang="en-GB" dirty="0" smtClean="0">
@@ -8930,6 +9211,37 @@
                 </a:schemeClr>
               </a:solidFill>
             </a:endParaRPr>
+          </a:p>
+        </p:txBody>
+      </p:sp>
+      <p:sp>
+        <p:nvSpPr>
+          <p:cNvPr id="9" name="Textfeld 8"/>
+          <p:cNvSpPr txBox="1"/>
+          <p:nvPr/>
+        </p:nvSpPr>
+        <p:spPr>
+          <a:xfrm>
+            <a:off x="837022" y="6047766"/>
+            <a:ext cx="3869556" cy="230832"/>
+          </a:xfrm>
+          <a:prstGeom prst="rect">
+            <a:avLst/>
+          </a:prstGeom>
+          <a:noFill/>
+        </p:spPr>
+        <p:txBody>
+          <a:bodyPr wrap="square" rtlCol="0">
+            <a:spAutoFit/>
+          </a:bodyPr>
+          <a:lstStyle/>
+          <a:p>
+            <a:pPr algn="ctr"/>
+            <a:r>
+              <a:rPr lang="en-GB" sz="900" i="1" dirty="0" smtClean="0"/>
+              <a:t>Baffle prototype</a:t>
+            </a:r>
+            <a:endParaRPr lang="en-GB" sz="900" i="1" dirty="0"/>
           </a:p>
         </p:txBody>
       </p:sp>

</xml_diff>